<commit_message>
Updated with additional functionality and added DB
</commit_message>
<xml_diff>
--- a/PMApp Proposal.pptx
+++ b/PMApp Proposal.pptx
@@ -742,7 +742,7 @@
             <a:fld id="{B7C3F878-F5E8-489B-AC8A-64F2A7E22C28}" type="datetimeFigureOut">
               <a:rPr lang="en-US" smtClean="0"/>
               <a:pPr/>
-              <a:t>1/3/20</a:t>
+              <a:t>1/4/20</a:t>
             </a:fld>
             <a:endParaRPr lang="en-US"/>
           </a:p>
@@ -923,7 +923,7 @@
             <a:fld id="{B7C3F878-F5E8-489B-AC8A-64F2A7E22C28}" type="datetimeFigureOut">
               <a:rPr lang="en-US" smtClean="0"/>
               <a:pPr/>
-              <a:t>1/3/20</a:t>
+              <a:t>1/4/20</a:t>
             </a:fld>
             <a:endParaRPr lang="en-US"/>
           </a:p>
@@ -1104,7 +1104,7 @@
             <a:fld id="{B7C3F878-F5E8-489B-AC8A-64F2A7E22C28}" type="datetimeFigureOut">
               <a:rPr lang="en-US" smtClean="0"/>
               <a:pPr/>
-              <a:t>1/3/20</a:t>
+              <a:t>1/4/20</a:t>
             </a:fld>
             <a:endParaRPr lang="en-US"/>
           </a:p>
@@ -1271,7 +1271,7 @@
             <a:fld id="{B7C3F878-F5E8-489B-AC8A-64F2A7E22C28}" type="datetimeFigureOut">
               <a:rPr lang="en-US" smtClean="0"/>
               <a:pPr/>
-              <a:t>1/3/20</a:t>
+              <a:t>1/4/20</a:t>
             </a:fld>
             <a:endParaRPr lang="en-US"/>
           </a:p>
@@ -1512,7 +1512,7 @@
             <a:fld id="{B7C3F878-F5E8-489B-AC8A-64F2A7E22C28}" type="datetimeFigureOut">
               <a:rPr lang="en-US" smtClean="0"/>
               <a:pPr/>
-              <a:t>1/3/20</a:t>
+              <a:t>1/4/20</a:t>
             </a:fld>
             <a:endParaRPr lang="en-US"/>
           </a:p>
@@ -1627,7 +1627,7 @@
             <a:fld id="{B7C3F878-F5E8-489B-AC8A-64F2A7E22C28}" type="datetimeFigureOut">
               <a:rPr lang="en-US" smtClean="0"/>
               <a:pPr/>
-              <a:t>1/3/20</a:t>
+              <a:t>1/4/20</a:t>
             </a:fld>
             <a:endParaRPr lang="en-US"/>
           </a:p>
@@ -2002,7 +2002,7 @@
             <a:fld id="{B7C3F878-F5E8-489B-AC8A-64F2A7E22C28}" type="datetimeFigureOut">
               <a:rPr lang="en-US" smtClean="0"/>
               <a:pPr/>
-              <a:t>1/3/20</a:t>
+              <a:t>1/4/20</a:t>
             </a:fld>
             <a:endParaRPr lang="en-US"/>
           </a:p>
@@ -2231,7 +2231,7 @@
             <a:fld id="{B7C3F878-F5E8-489B-AC8A-64F2A7E22C28}" type="datetimeFigureOut">
               <a:rPr lang="en-US" smtClean="0"/>
               <a:pPr/>
-              <a:t>1/3/20</a:t>
+              <a:t>1/4/20</a:t>
             </a:fld>
             <a:endParaRPr lang="en-US"/>
           </a:p>
@@ -2323,7 +2323,7 @@
             <a:fld id="{B7C3F878-F5E8-489B-AC8A-64F2A7E22C28}" type="datetimeFigureOut">
               <a:rPr lang="en-US" smtClean="0"/>
               <a:pPr/>
-              <a:t>1/3/20</a:t>
+              <a:t>1/4/20</a:t>
             </a:fld>
             <a:endParaRPr lang="en-US"/>
           </a:p>
@@ -3152,7 +3152,7 @@
             <a:fld id="{B7C3F878-F5E8-489B-AC8A-64F2A7E22C28}" type="datetimeFigureOut">
               <a:rPr lang="en-US" smtClean="0"/>
               <a:pPr/>
-              <a:t>1/3/20</a:t>
+              <a:t>1/4/20</a:t>
             </a:fld>
             <a:endParaRPr lang="en-US"/>
           </a:p>
@@ -3985,7 +3985,7 @@
             <a:fld id="{B7C3F878-F5E8-489B-AC8A-64F2A7E22C28}" type="datetimeFigureOut">
               <a:rPr lang="en-US" smtClean="0"/>
               <a:pPr/>
-              <a:t>1/3/20</a:t>
+              <a:t>1/4/20</a:t>
             </a:fld>
             <a:endParaRPr lang="en-US"/>
           </a:p>
@@ -4641,7 +4641,7 @@
             <a:fld id="{B7C3F878-F5E8-489B-AC8A-64F2A7E22C28}" type="datetimeFigureOut">
               <a:rPr lang="en-US" smtClean="0"/>
               <a:pPr/>
-              <a:t>1/3/20</a:t>
+              <a:t>1/4/20</a:t>
             </a:fld>
             <a:endParaRPr lang="en-US" dirty="0"/>
           </a:p>
@@ -5383,7 +5383,7 @@
         <p:spPr>
           <a:xfrm>
             <a:off x="4832405" y="3348762"/>
-            <a:ext cx="2837961" cy="1723549"/>
+            <a:ext cx="2837961" cy="1877437"/>
           </a:xfrm>
           <a:prstGeom prst="rect">
             <a:avLst/>
@@ -5415,7 +5415,20 @@
             </a:pPr>
             <a:r>
               <a:rPr lang="en-US" sz="1000" dirty="0" smtClean="0"/>
-              <a:t>Delete resources and tasks</a:t>
+              <a:t>Improve validation checks</a:t>
+            </a:r>
+          </a:p>
+          <a:p>
+            <a:pPr marL="342900" indent="-342900">
+              <a:buAutoNum type="arabicPeriod"/>
+            </a:pPr>
+            <a:r>
+              <a:rPr lang="en-US" sz="1000" dirty="0" smtClean="0"/>
+              <a:t>Delete </a:t>
+            </a:r>
+            <a:r>
+              <a:rPr lang="en-US" sz="1000" dirty="0" smtClean="0"/>
+              <a:t>resources and tasks</a:t>
             </a:r>
           </a:p>
           <a:p>

</xml_diff>